<commit_message>
Login adn Register exception, doc for hw7 and demo ppt
</commit_message>
<xml_diff>
--- a/document/OOAD_Final_demo.pptx
+++ b/document/OOAD_Final_demo.pptx
@@ -12,11 +12,9 @@
     <p:sldId id="279" r:id="rId6"/>
     <p:sldId id="280" r:id="rId7"/>
     <p:sldId id="282" r:id="rId8"/>
-    <p:sldId id="286" r:id="rId9"/>
-    <p:sldId id="287" r:id="rId10"/>
-    <p:sldId id="308" r:id="rId11"/>
-    <p:sldId id="284" r:id="rId12"/>
-    <p:sldId id="307" r:id="rId13"/>
+    <p:sldId id="308" r:id="rId9"/>
+    <p:sldId id="284" r:id="rId10"/>
+    <p:sldId id="307" r:id="rId11"/>
   </p:sldIdLst>
   <p:sldSz cx="12192000" cy="6858000"/>
   <p:notesSz cx="6858000" cy="9144000"/>
@@ -7808,185 +7806,6 @@
             <p:ph type="title"/>
           </p:nvPr>
         </p:nvSpPr>
-        <p:spPr/>
-        <p:txBody>
-          <a:bodyPr/>
-          <a:lstStyle/>
-          <a:p>
-            <a:endParaRPr lang="zh-TW" altLang="en-US"/>
-          </a:p>
-        </p:txBody>
-      </p:sp>
-      <p:sp>
-        <p:nvSpPr>
-          <p:cNvPr id="3" name="內容版面配置區 2"/>
-          <p:cNvSpPr>
-            <a:spLocks noGrp="1"/>
-          </p:cNvSpPr>
-          <p:nvPr>
-            <p:ph idx="1"/>
-          </p:nvPr>
-        </p:nvSpPr>
-        <p:spPr/>
-        <p:txBody>
-          <a:bodyPr/>
-          <a:lstStyle/>
-          <a:p>
-            <a:endParaRPr lang="zh-TW" altLang="en-US"/>
-          </a:p>
-        </p:txBody>
-      </p:sp>
-      <p:pic>
-        <p:nvPicPr>
-          <p:cNvPr id="5" name="圖片 4"/>
-          <p:cNvPicPr>
-            <a:picLocks noChangeAspect="1"/>
-          </p:cNvPicPr>
-          <p:nvPr/>
-        </p:nvPicPr>
-        <p:blipFill>
-          <a:blip r:embed="rId2"/>
-          <a:stretch>
-            <a:fillRect/>
-          </a:stretch>
-        </p:blipFill>
-        <p:spPr>
-          <a:xfrm>
-            <a:off x="2842952" y="181232"/>
-            <a:ext cx="6620811" cy="6400362"/>
-          </a:xfrm>
-          <a:prstGeom prst="rect">
-            <a:avLst/>
-          </a:prstGeom>
-        </p:spPr>
-      </p:pic>
-    </p:spTree>
-    <p:extLst>
-      <p:ext uri="{BB962C8B-B14F-4D97-AF65-F5344CB8AC3E}">
-        <p14:creationId xmlns:p14="http://schemas.microsoft.com/office/powerpoint/2010/main" val="2457498206"/>
-      </p:ext>
-    </p:extLst>
-  </p:cSld>
-  <p:clrMapOvr>
-    <a:masterClrMapping/>
-  </p:clrMapOvr>
-  <p:timing>
-    <p:tnLst>
-      <p:par>
-        <p:cTn id="1" dur="indefinite" restart="never" nodeType="tmRoot"/>
-      </p:par>
-    </p:tnLst>
-  </p:timing>
-</p:sld>
-</file>
-
-<file path=ppt/slides/slide11.xml><?xml version="1.0" encoding="utf-8"?>
-<p:sld xmlns:a="http://schemas.openxmlformats.org/drawingml/2006/main" xmlns:r="http://schemas.openxmlformats.org/officeDocument/2006/relationships" xmlns:p="http://schemas.openxmlformats.org/presentationml/2006/main">
-  <p:cSld>
-    <p:spTree>
-      <p:nvGrpSpPr>
-        <p:cNvPr id="1" name=""/>
-        <p:cNvGrpSpPr/>
-        <p:nvPr/>
-      </p:nvGrpSpPr>
-      <p:grpSpPr>
-        <a:xfrm>
-          <a:off x="0" y="0"/>
-          <a:ext cx="0" cy="0"/>
-          <a:chOff x="0" y="0"/>
-          <a:chExt cx="0" cy="0"/>
-        </a:xfrm>
-      </p:grpSpPr>
-      <p:sp>
-        <p:nvSpPr>
-          <p:cNvPr id="2" name="標題 1"/>
-          <p:cNvSpPr>
-            <a:spLocks noGrp="1"/>
-          </p:cNvSpPr>
-          <p:nvPr>
-            <p:ph type="title"/>
-          </p:nvPr>
-        </p:nvSpPr>
-        <p:spPr/>
-        <p:txBody>
-          <a:bodyPr/>
-          <a:lstStyle/>
-          <a:p>
-            <a:pPr algn="ctr"/>
-            <a:r>
-              <a:rPr lang="en-US" altLang="zh-TW" dirty="0" smtClean="0"/>
-              <a:t>ALL UNIT TESTS</a:t>
-            </a:r>
-            <a:endParaRPr lang="zh-TW" altLang="en-US" dirty="0"/>
-          </a:p>
-        </p:txBody>
-      </p:sp>
-      <p:sp>
-        <p:nvSpPr>
-          <p:cNvPr id="3" name="內容版面配置區 2"/>
-          <p:cNvSpPr>
-            <a:spLocks noGrp="1"/>
-          </p:cNvSpPr>
-          <p:nvPr>
-            <p:ph idx="1"/>
-          </p:nvPr>
-        </p:nvSpPr>
-        <p:spPr/>
-        <p:txBody>
-          <a:bodyPr/>
-          <a:lstStyle/>
-          <a:p>
-            <a:endParaRPr lang="zh-TW" altLang="en-US" dirty="0"/>
-          </a:p>
-        </p:txBody>
-      </p:sp>
-    </p:spTree>
-    <p:extLst>
-      <p:ext uri="{BB962C8B-B14F-4D97-AF65-F5344CB8AC3E}">
-        <p14:creationId xmlns:p14="http://schemas.microsoft.com/office/powerpoint/2010/main" val="93982817"/>
-      </p:ext>
-    </p:extLst>
-  </p:cSld>
-  <p:clrMapOvr>
-    <a:masterClrMapping/>
-  </p:clrMapOvr>
-  <p:timing>
-    <p:tnLst>
-      <p:par>
-        <p:cTn id="1" dur="indefinite" restart="never" nodeType="tmRoot"/>
-      </p:par>
-    </p:tnLst>
-  </p:timing>
-</p:sld>
-</file>
-
-<file path=ppt/slides/slide12.xml><?xml version="1.0" encoding="utf-8"?>
-<p:sld xmlns:a="http://schemas.openxmlformats.org/drawingml/2006/main" xmlns:r="http://schemas.openxmlformats.org/officeDocument/2006/relationships" xmlns:p="http://schemas.openxmlformats.org/presentationml/2006/main">
-  <p:cSld>
-    <p:spTree>
-      <p:nvGrpSpPr>
-        <p:cNvPr id="1" name=""/>
-        <p:cNvGrpSpPr/>
-        <p:nvPr/>
-      </p:nvGrpSpPr>
-      <p:grpSpPr>
-        <a:xfrm>
-          <a:off x="0" y="0"/>
-          <a:ext cx="0" cy="0"/>
-          <a:chOff x="0" y="0"/>
-          <a:chExt cx="0" cy="0"/>
-        </a:xfrm>
-      </p:grpSpPr>
-      <p:sp>
-        <p:nvSpPr>
-          <p:cNvPr id="2" name="標題 1"/>
-          <p:cNvSpPr>
-            <a:spLocks noGrp="1"/>
-          </p:cNvSpPr>
-          <p:nvPr>
-            <p:ph type="title"/>
-          </p:nvPr>
-        </p:nvSpPr>
         <p:spPr>
           <a:xfrm>
             <a:off x="2589212" y="2596601"/>
@@ -8460,32 +8279,15 @@
           </a:p>
         </p:txBody>
       </p:sp>
-      <p:sp>
-        <p:nvSpPr>
-          <p:cNvPr id="3" name="內容版面配置區 2"/>
-          <p:cNvSpPr>
-            <a:spLocks noGrp="1"/>
-          </p:cNvSpPr>
-          <p:nvPr>
-            <p:ph idx="1"/>
-          </p:nvPr>
-        </p:nvSpPr>
-        <p:spPr/>
-        <p:txBody>
-          <a:bodyPr/>
-          <a:lstStyle/>
-          <a:p>
-            <a:endParaRPr lang="zh-TW" altLang="en-US"/>
-          </a:p>
-        </p:txBody>
-      </p:sp>
       <p:pic>
         <p:nvPicPr>
-          <p:cNvPr id="5" name="圖片 4"/>
+          <p:cNvPr id="4" name="內容版面配置區 3"/>
           <p:cNvPicPr>
-            <a:picLocks noChangeAspect="1"/>
+            <a:picLocks noGrp="1" noChangeAspect="1"/>
           </p:cNvPicPr>
-          <p:nvPr/>
+          <p:nvPr>
+            <p:ph idx="1"/>
+          </p:nvPr>
         </p:nvPicPr>
         <p:blipFill>
           <a:blip r:embed="rId2"/>
@@ -8495,8 +8297,8 @@
         </p:blipFill>
         <p:spPr>
           <a:xfrm>
-            <a:off x="1253853" y="1502230"/>
-            <a:ext cx="10607378" cy="5015270"/>
+            <a:off x="1806247" y="1400502"/>
+            <a:ext cx="7826483" cy="5227151"/>
           </a:xfrm>
           <a:prstGeom prst="rect">
             <a:avLst/>
@@ -8582,30 +8384,6 @@
           </a:p>
         </p:txBody>
       </p:sp>
-      <p:pic>
-        <p:nvPicPr>
-          <p:cNvPr id="5" name="圖片 4"/>
-          <p:cNvPicPr>
-            <a:picLocks noChangeAspect="1"/>
-          </p:cNvPicPr>
-          <p:nvPr/>
-        </p:nvPicPr>
-        <p:blipFill>
-          <a:blip r:embed="rId2"/>
-          <a:stretch>
-            <a:fillRect/>
-          </a:stretch>
-        </p:blipFill>
-        <p:spPr>
-          <a:xfrm>
-            <a:off x="141311" y="2521132"/>
-            <a:ext cx="12259695" cy="3246399"/>
-          </a:xfrm>
-          <a:prstGeom prst="rect">
-            <a:avLst/>
-          </a:prstGeom>
-        </p:spPr>
-      </p:pic>
     </p:spTree>
     <p:extLst>
       <p:ext uri="{BB962C8B-B14F-4D97-AF65-F5344CB8AC3E}">
@@ -8669,7 +8447,7 @@
       </p:sp>
       <p:pic>
         <p:nvPicPr>
-          <p:cNvPr id="4" name="內容版面配置區 3"/>
+          <p:cNvPr id="5" name="內容版面配置區 4"/>
           <p:cNvPicPr>
             <a:picLocks noGrp="1" noChangeAspect="1"/>
           </p:cNvPicPr>
@@ -8685,8 +8463,32 @@
         </p:blipFill>
         <p:spPr>
           <a:xfrm>
-            <a:off x="2697428" y="1905000"/>
-            <a:ext cx="7349226" cy="4762492"/>
+            <a:off x="357030" y="1321675"/>
+            <a:ext cx="4471789" cy="5325800"/>
+          </a:xfrm>
+          <a:prstGeom prst="rect">
+            <a:avLst/>
+          </a:prstGeom>
+        </p:spPr>
+      </p:pic>
+      <p:pic>
+        <p:nvPicPr>
+          <p:cNvPr id="7" name="圖片 6"/>
+          <p:cNvPicPr>
+            <a:picLocks noChangeAspect="1"/>
+          </p:cNvPicPr>
+          <p:nvPr/>
+        </p:nvPicPr>
+        <p:blipFill>
+          <a:blip r:embed="rId3"/>
+          <a:stretch>
+            <a:fillRect/>
+          </a:stretch>
+        </p:blipFill>
+        <p:spPr>
+          <a:xfrm>
+            <a:off x="4828819" y="1321676"/>
+            <a:ext cx="4195707" cy="5325800"/>
           </a:xfrm>
           <a:prstGeom prst="rect">
             <a:avLst/>
@@ -8745,12 +8547,7 @@
           <a:bodyPr/>
           <a:lstStyle/>
           <a:p>
-            <a:pPr algn="ctr"/>
-            <a:r>
-              <a:rPr lang="en-US" altLang="zh-TW" dirty="0"/>
-              <a:t>TOTAL TIME FOR MEMBERS</a:t>
-            </a:r>
-            <a:endParaRPr lang="zh-TW" altLang="en-US" dirty="0"/>
+            <a:endParaRPr lang="zh-TW" altLang="en-US"/>
           </a:p>
         </p:txBody>
       </p:sp>
@@ -8773,34 +8570,10 @@
           </a:p>
         </p:txBody>
       </p:sp>
-      <p:pic>
-        <p:nvPicPr>
-          <p:cNvPr id="4" name="圖片 3"/>
-          <p:cNvPicPr>
-            <a:picLocks noChangeAspect="1"/>
-          </p:cNvPicPr>
-          <p:nvPr/>
-        </p:nvPicPr>
-        <p:blipFill>
-          <a:blip r:embed="rId2"/>
-          <a:stretch>
-            <a:fillRect/>
-          </a:stretch>
-        </p:blipFill>
-        <p:spPr>
-          <a:xfrm>
-            <a:off x="2412224" y="1759175"/>
-            <a:ext cx="8720735" cy="4152047"/>
-          </a:xfrm>
-          <a:prstGeom prst="rect">
-            <a:avLst/>
-          </a:prstGeom>
-        </p:spPr>
-      </p:pic>
     </p:spTree>
     <p:extLst>
       <p:ext uri="{BB962C8B-B14F-4D97-AF65-F5344CB8AC3E}">
-        <p14:creationId xmlns:p14="http://schemas.microsoft.com/office/powerpoint/2010/main" val="721964522"/>
+        <p14:creationId xmlns:p14="http://schemas.microsoft.com/office/powerpoint/2010/main" val="2457498206"/>
       </p:ext>
     </p:extLst>
   </p:cSld>
@@ -8851,43 +8624,36 @@
           <a:p>
             <a:pPr algn="ctr"/>
             <a:r>
-              <a:rPr lang="en-US" altLang="zh-TW" dirty="0"/>
-              <a:t>TOTAL TIME FOR MEMBERS</a:t>
+              <a:rPr lang="en-US" altLang="zh-TW" dirty="0" smtClean="0"/>
+              <a:t>ALL UNIT TESTS</a:t>
             </a:r>
             <a:endParaRPr lang="zh-TW" altLang="en-US" dirty="0"/>
           </a:p>
         </p:txBody>
       </p:sp>
-      <p:pic>
-        <p:nvPicPr>
-          <p:cNvPr id="4" name="內容版面配置區 3"/>
-          <p:cNvPicPr>
-            <a:picLocks noGrp="1" noChangeAspect="1"/>
-          </p:cNvPicPr>
+      <p:sp>
+        <p:nvSpPr>
+          <p:cNvPr id="3" name="內容版面配置區 2"/>
+          <p:cNvSpPr>
+            <a:spLocks noGrp="1"/>
+          </p:cNvSpPr>
           <p:nvPr>
             <p:ph idx="1"/>
           </p:nvPr>
-        </p:nvPicPr>
-        <p:blipFill>
-          <a:blip r:embed="rId2"/>
-          <a:stretch>
-            <a:fillRect/>
-          </a:stretch>
-        </p:blipFill>
-        <p:spPr>
-          <a:xfrm>
-            <a:off x="2592925" y="1905000"/>
-            <a:ext cx="8544629" cy="4549737"/>
-          </a:xfrm>
-          <a:prstGeom prst="rect">
-            <a:avLst/>
-          </a:prstGeom>
-        </p:spPr>
-      </p:pic>
+        </p:nvSpPr>
+        <p:spPr/>
+        <p:txBody>
+          <a:bodyPr/>
+          <a:lstStyle/>
+          <a:p>
+            <a:endParaRPr lang="zh-TW" altLang="en-US" dirty="0"/>
+          </a:p>
+        </p:txBody>
+      </p:sp>
     </p:spTree>
     <p:extLst>
       <p:ext uri="{BB962C8B-B14F-4D97-AF65-F5344CB8AC3E}">
-        <p14:creationId xmlns:p14="http://schemas.microsoft.com/office/powerpoint/2010/main" val="95231269"/>
+        <p14:creationId xmlns:p14="http://schemas.microsoft.com/office/powerpoint/2010/main" val="93982817"/>
       </p:ext>
     </p:extLst>
   </p:cSld>

</xml_diff>

<commit_message>
final ppt ,doc , class diagram
</commit_message>
<xml_diff>
--- a/document/OOAD_Final_demo.pptx
+++ b/document/OOAD_Final_demo.pptx
@@ -13,8 +13,12 @@
     <p:sldId id="280" r:id="rId7"/>
     <p:sldId id="282" r:id="rId8"/>
     <p:sldId id="308" r:id="rId9"/>
-    <p:sldId id="284" r:id="rId10"/>
-    <p:sldId id="307" r:id="rId11"/>
+    <p:sldId id="309" r:id="rId10"/>
+    <p:sldId id="310" r:id="rId11"/>
+    <p:sldId id="284" r:id="rId12"/>
+    <p:sldId id="311" r:id="rId13"/>
+    <p:sldId id="312" r:id="rId14"/>
+    <p:sldId id="307" r:id="rId15"/>
   </p:sldIdLst>
   <p:sldSz cx="12192000" cy="6858000"/>
   <p:notesSz cx="6858000" cy="9144000"/>
@@ -309,7 +313,7 @@
           <a:p>
             <a:fld id="{28DAA045-4540-44C0-BB87-F5B0427377A2}" type="datetimeFigureOut">
               <a:rPr lang="zh-TW" altLang="en-US" smtClean="0"/>
-              <a:t>2017/6/17</a:t>
+              <a:t>2017/6/18</a:t>
             </a:fld>
             <a:endParaRPr lang="zh-TW" altLang="en-US"/>
           </a:p>
@@ -647,7 +651,7 @@
           <a:p>
             <a:fld id="{28DAA045-4540-44C0-BB87-F5B0427377A2}" type="datetimeFigureOut">
               <a:rPr lang="zh-TW" altLang="en-US" smtClean="0"/>
-              <a:t>2017/6/17</a:t>
+              <a:t>2017/6/18</a:t>
             </a:fld>
             <a:endParaRPr lang="zh-TW" altLang="en-US"/>
           </a:p>
@@ -1048,7 +1052,7 @@
           <a:p>
             <a:fld id="{28DAA045-4540-44C0-BB87-F5B0427377A2}" type="datetimeFigureOut">
               <a:rPr lang="zh-TW" altLang="en-US" smtClean="0"/>
-              <a:t>2017/6/17</a:t>
+              <a:t>2017/6/18</a:t>
             </a:fld>
             <a:endParaRPr lang="zh-TW" altLang="en-US"/>
           </a:p>
@@ -1384,7 +1388,7 @@
           <a:p>
             <a:fld id="{28DAA045-4540-44C0-BB87-F5B0427377A2}" type="datetimeFigureOut">
               <a:rPr lang="zh-TW" altLang="en-US" smtClean="0"/>
-              <a:t>2017/6/17</a:t>
+              <a:t>2017/6/18</a:t>
             </a:fld>
             <a:endParaRPr lang="zh-TW" altLang="en-US"/>
           </a:p>
@@ -1704,7 +1708,7 @@
           <a:p>
             <a:fld id="{28DAA045-4540-44C0-BB87-F5B0427377A2}" type="datetimeFigureOut">
               <a:rPr lang="zh-TW" altLang="en-US" smtClean="0"/>
-              <a:t>2017/6/17</a:t>
+              <a:t>2017/6/18</a:t>
             </a:fld>
             <a:endParaRPr lang="zh-TW" altLang="en-US"/>
           </a:p>
@@ -2100,7 +2104,7 @@
           <a:p>
             <a:fld id="{28DAA045-4540-44C0-BB87-F5B0427377A2}" type="datetimeFigureOut">
               <a:rPr lang="zh-TW" altLang="en-US" smtClean="0"/>
-              <a:t>2017/6/17</a:t>
+              <a:t>2017/6/18</a:t>
             </a:fld>
             <a:endParaRPr lang="zh-TW" altLang="en-US"/>
           </a:p>
@@ -2357,7 +2361,7 @@
           <a:p>
             <a:fld id="{28DAA045-4540-44C0-BB87-F5B0427377A2}" type="datetimeFigureOut">
               <a:rPr lang="zh-TW" altLang="en-US" smtClean="0"/>
-              <a:t>2017/6/17</a:t>
+              <a:t>2017/6/18</a:t>
             </a:fld>
             <a:endParaRPr lang="zh-TW" altLang="en-US"/>
           </a:p>
@@ -2619,7 +2623,7 @@
           <a:p>
             <a:fld id="{28DAA045-4540-44C0-BB87-F5B0427377A2}" type="datetimeFigureOut">
               <a:rPr lang="zh-TW" altLang="en-US" smtClean="0"/>
-              <a:t>2017/6/17</a:t>
+              <a:t>2017/6/18</a:t>
             </a:fld>
             <a:endParaRPr lang="zh-TW" altLang="en-US"/>
           </a:p>
@@ -2881,7 +2885,7 @@
           <a:p>
             <a:fld id="{28DAA045-4540-44C0-BB87-F5B0427377A2}" type="datetimeFigureOut">
               <a:rPr lang="zh-TW" altLang="en-US" smtClean="0"/>
-              <a:t>2017/6/17</a:t>
+              <a:t>2017/6/18</a:t>
             </a:fld>
             <a:endParaRPr lang="zh-TW" altLang="en-US"/>
           </a:p>
@@ -3210,7 +3214,7 @@
           <a:p>
             <a:fld id="{28DAA045-4540-44C0-BB87-F5B0427377A2}" type="datetimeFigureOut">
               <a:rPr lang="zh-TW" altLang="en-US" smtClean="0"/>
-              <a:t>2017/6/17</a:t>
+              <a:t>2017/6/18</a:t>
             </a:fld>
             <a:endParaRPr lang="zh-TW" altLang="en-US"/>
           </a:p>
@@ -3533,7 +3537,7 @@
           <a:p>
             <a:fld id="{28DAA045-4540-44C0-BB87-F5B0427377A2}" type="datetimeFigureOut">
               <a:rPr lang="zh-TW" altLang="en-US" smtClean="0"/>
-              <a:t>2017/6/17</a:t>
+              <a:t>2017/6/18</a:t>
             </a:fld>
             <a:endParaRPr lang="zh-TW" altLang="en-US"/>
           </a:p>
@@ -3990,7 +3994,7 @@
           <a:p>
             <a:fld id="{28DAA045-4540-44C0-BB87-F5B0427377A2}" type="datetimeFigureOut">
               <a:rPr lang="zh-TW" altLang="en-US" smtClean="0"/>
-              <a:t>2017/6/17</a:t>
+              <a:t>2017/6/18</a:t>
             </a:fld>
             <a:endParaRPr lang="zh-TW" altLang="en-US"/>
           </a:p>
@@ -4195,7 +4199,7 @@
           <a:p>
             <a:fld id="{28DAA045-4540-44C0-BB87-F5B0427377A2}" type="datetimeFigureOut">
               <a:rPr lang="zh-TW" altLang="en-US" smtClean="0"/>
-              <a:t>2017/6/17</a:t>
+              <a:t>2017/6/18</a:t>
             </a:fld>
             <a:endParaRPr lang="zh-TW" altLang="en-US"/>
           </a:p>
@@ -4372,7 +4376,7 @@
           <a:p>
             <a:fld id="{28DAA045-4540-44C0-BB87-F5B0427377A2}" type="datetimeFigureOut">
               <a:rPr lang="zh-TW" altLang="en-US" smtClean="0"/>
-              <a:t>2017/6/17</a:t>
+              <a:t>2017/6/18</a:t>
             </a:fld>
             <a:endParaRPr lang="zh-TW" altLang="en-US"/>
           </a:p>
@@ -4705,7 +4709,7 @@
           <a:p>
             <a:fld id="{28DAA045-4540-44C0-BB87-F5B0427377A2}" type="datetimeFigureOut">
               <a:rPr lang="zh-TW" altLang="en-US" smtClean="0"/>
-              <a:t>2017/6/17</a:t>
+              <a:t>2017/6/18</a:t>
             </a:fld>
             <a:endParaRPr lang="zh-TW" altLang="en-US"/>
           </a:p>
@@ -5050,7 +5054,7 @@
           <a:p>
             <a:fld id="{28DAA045-4540-44C0-BB87-F5B0427377A2}" type="datetimeFigureOut">
               <a:rPr lang="zh-TW" altLang="en-US" smtClean="0"/>
-              <a:t>2017/6/17</a:t>
+              <a:t>2017/6/18</a:t>
             </a:fld>
             <a:endParaRPr lang="zh-TW" altLang="en-US"/>
           </a:p>
@@ -7167,7 +7171,7 @@
           <a:p>
             <a:fld id="{28DAA045-4540-44C0-BB87-F5B0427377A2}" type="datetimeFigureOut">
               <a:rPr lang="zh-TW" altLang="en-US" smtClean="0"/>
-              <a:t>2017/6/17</a:t>
+              <a:t>2017/6/18</a:t>
             </a:fld>
             <a:endParaRPr lang="zh-TW" altLang="en-US"/>
           </a:p>
@@ -7796,19 +7800,546 @@
           <a:chExt cx="0" cy="0"/>
         </a:xfrm>
       </p:grpSpPr>
-      <p:sp>
-        <p:nvSpPr>
-          <p:cNvPr id="2" name="標題 1"/>
-          <p:cNvSpPr>
-            <a:spLocks noGrp="1"/>
-          </p:cNvSpPr>
-          <p:nvPr>
-            <p:ph type="title"/>
-          </p:nvPr>
-        </p:nvSpPr>
+      <p:pic>
+        <p:nvPicPr>
+          <p:cNvPr id="4" name="圖片 3"/>
+          <p:cNvPicPr>
+            <a:picLocks noChangeAspect="1"/>
+          </p:cNvPicPr>
+          <p:nvPr/>
+        </p:nvPicPr>
+        <p:blipFill>
+          <a:blip r:embed="rId2"/>
+          <a:stretch>
+            <a:fillRect/>
+          </a:stretch>
+        </p:blipFill>
         <p:spPr>
           <a:xfrm>
-            <a:off x="2589212" y="2596601"/>
+            <a:off x="1531926" y="2520871"/>
+            <a:ext cx="10114205" cy="1676208"/>
+          </a:xfrm>
+          <a:prstGeom prst="rect">
+            <a:avLst/>
+          </a:prstGeom>
+        </p:spPr>
+      </p:pic>
+      <p:sp>
+        <p:nvSpPr>
+          <p:cNvPr id="7" name="標題 6"/>
+          <p:cNvSpPr>
+            <a:spLocks noGrp="1"/>
+          </p:cNvSpPr>
+          <p:nvPr>
+            <p:ph type="title"/>
+          </p:nvPr>
+        </p:nvSpPr>
+        <p:spPr/>
+        <p:txBody>
+          <a:bodyPr/>
+          <a:lstStyle/>
+          <a:p>
+            <a:endParaRPr lang="zh-TW" altLang="en-US"/>
+          </a:p>
+        </p:txBody>
+      </p:sp>
+      <p:sp>
+        <p:nvSpPr>
+          <p:cNvPr id="8" name="標題 1"/>
+          <p:cNvSpPr txBox="1">
+            <a:spLocks/>
+          </p:cNvSpPr>
+          <p:nvPr/>
+        </p:nvSpPr>
+        <p:spPr>
+          <a:xfrm>
+            <a:off x="1720089" y="565921"/>
+            <a:ext cx="10682500" cy="1280890"/>
+          </a:xfrm>
+          <a:prstGeom prst="rect">
+            <a:avLst/>
+          </a:prstGeom>
+        </p:spPr>
+        <p:txBody>
+          <a:bodyPr vert="horz" lIns="91440" tIns="45720" rIns="91440" bIns="45720" rtlCol="0" anchor="t">
+            <a:noAutofit/>
+          </a:bodyPr>
+          <a:lstStyle>
+            <a:lvl1pPr algn="l" defTabSz="457200" rtl="0" eaLnBrk="1" latinLnBrk="0" hangingPunct="1">
+              <a:spcBef>
+                <a:spcPct val="0"/>
+              </a:spcBef>
+              <a:buNone/>
+              <a:defRPr sz="3600" kern="1200">
+                <a:solidFill>
+                  <a:schemeClr val="tx1">
+                    <a:lumMod val="85000"/>
+                    <a:lumOff val="15000"/>
+                  </a:schemeClr>
+                </a:solidFill>
+                <a:latin typeface="+mj-lt"/>
+                <a:ea typeface="+mj-ea"/>
+                <a:cs typeface="+mj-cs"/>
+              </a:defRPr>
+            </a:lvl1pPr>
+            <a:lvl2pPr eaLnBrk="1" hangingPunct="1">
+              <a:defRPr>
+                <a:solidFill>
+                  <a:schemeClr val="tx2"/>
+                </a:solidFill>
+              </a:defRPr>
+            </a:lvl2pPr>
+            <a:lvl3pPr eaLnBrk="1" hangingPunct="1">
+              <a:defRPr>
+                <a:solidFill>
+                  <a:schemeClr val="tx2"/>
+                </a:solidFill>
+              </a:defRPr>
+            </a:lvl3pPr>
+            <a:lvl4pPr eaLnBrk="1" hangingPunct="1">
+              <a:defRPr>
+                <a:solidFill>
+                  <a:schemeClr val="tx2"/>
+                </a:solidFill>
+              </a:defRPr>
+            </a:lvl4pPr>
+            <a:lvl5pPr eaLnBrk="1" hangingPunct="1">
+              <a:defRPr>
+                <a:solidFill>
+                  <a:schemeClr val="tx2"/>
+                </a:solidFill>
+              </a:defRPr>
+            </a:lvl5pPr>
+            <a:lvl6pPr eaLnBrk="1" hangingPunct="1">
+              <a:defRPr>
+                <a:solidFill>
+                  <a:schemeClr val="tx2"/>
+                </a:solidFill>
+              </a:defRPr>
+            </a:lvl6pPr>
+            <a:lvl7pPr eaLnBrk="1" hangingPunct="1">
+              <a:defRPr>
+                <a:solidFill>
+                  <a:schemeClr val="tx2"/>
+                </a:solidFill>
+              </a:defRPr>
+            </a:lvl7pPr>
+            <a:lvl8pPr eaLnBrk="1" hangingPunct="1">
+              <a:defRPr>
+                <a:solidFill>
+                  <a:schemeClr val="tx2"/>
+                </a:solidFill>
+              </a:defRPr>
+            </a:lvl8pPr>
+            <a:lvl9pPr eaLnBrk="1" hangingPunct="1">
+              <a:defRPr>
+                <a:solidFill>
+                  <a:schemeClr val="tx2"/>
+                </a:solidFill>
+              </a:defRPr>
+            </a:lvl9pPr>
+          </a:lstStyle>
+          <a:p>
+            <a:r>
+              <a:rPr lang="en-US" altLang="zh-TW" sz="4000" smtClean="0"/>
+              <a:t>Source code of significant functionality</a:t>
+            </a:r>
+            <a:endParaRPr lang="zh-TW" altLang="en-US" sz="4000" dirty="0"/>
+          </a:p>
+        </p:txBody>
+      </p:sp>
+      <p:sp>
+        <p:nvSpPr>
+          <p:cNvPr id="9" name="文字方塊 8"/>
+          <p:cNvSpPr txBox="1"/>
+          <p:nvPr/>
+        </p:nvSpPr>
+        <p:spPr>
+          <a:xfrm>
+            <a:off x="1521228" y="1720334"/>
+            <a:ext cx="2942707" cy="954107"/>
+          </a:xfrm>
+          <a:prstGeom prst="rect">
+            <a:avLst/>
+          </a:prstGeom>
+          <a:noFill/>
+        </p:spPr>
+        <p:txBody>
+          <a:bodyPr wrap="square" rtlCol="0">
+            <a:spAutoFit/>
+          </a:bodyPr>
+          <a:lstStyle/>
+          <a:p>
+            <a:r>
+              <a:rPr lang="en-US" altLang="zh-TW" sz="2800" smtClean="0"/>
+              <a:t>ProjectManager</a:t>
+            </a:r>
+            <a:endParaRPr lang="zh-TW" altLang="en-US" sz="2800" dirty="0"/>
+          </a:p>
+        </p:txBody>
+      </p:sp>
+    </p:spTree>
+    <p:extLst>
+      <p:ext uri="{BB962C8B-B14F-4D97-AF65-F5344CB8AC3E}">
+        <p14:creationId xmlns:p14="http://schemas.microsoft.com/office/powerpoint/2010/main" val="679214384"/>
+      </p:ext>
+    </p:extLst>
+  </p:cSld>
+  <p:clrMapOvr>
+    <a:masterClrMapping/>
+  </p:clrMapOvr>
+  <p:timing>
+    <p:tnLst>
+      <p:par>
+        <p:cTn id="1" dur="indefinite" restart="never" nodeType="tmRoot"/>
+      </p:par>
+    </p:tnLst>
+  </p:timing>
+</p:sld>
+</file>
+
+<file path=ppt/slides/slide11.xml><?xml version="1.0" encoding="utf-8"?>
+<p:sld xmlns:a="http://schemas.openxmlformats.org/drawingml/2006/main" xmlns:r="http://schemas.openxmlformats.org/officeDocument/2006/relationships" xmlns:p="http://schemas.openxmlformats.org/presentationml/2006/main">
+  <p:cSld>
+    <p:spTree>
+      <p:nvGrpSpPr>
+        <p:cNvPr id="1" name=""/>
+        <p:cNvGrpSpPr/>
+        <p:nvPr/>
+      </p:nvGrpSpPr>
+      <p:grpSpPr>
+        <a:xfrm>
+          <a:off x="0" y="0"/>
+          <a:ext cx="0" cy="0"/>
+          <a:chOff x="0" y="0"/>
+          <a:chExt cx="0" cy="0"/>
+        </a:xfrm>
+      </p:grpSpPr>
+      <p:sp>
+        <p:nvSpPr>
+          <p:cNvPr id="2" name="標題 1"/>
+          <p:cNvSpPr>
+            <a:spLocks noGrp="1"/>
+          </p:cNvSpPr>
+          <p:nvPr>
+            <p:ph type="title"/>
+          </p:nvPr>
+        </p:nvSpPr>
+        <p:spPr>
+          <a:xfrm>
+            <a:off x="1678525" y="2868547"/>
+            <a:ext cx="8911687" cy="1280890"/>
+          </a:xfrm>
+        </p:spPr>
+        <p:txBody>
+          <a:bodyPr/>
+          <a:lstStyle/>
+          <a:p>
+            <a:pPr algn="ctr"/>
+            <a:r>
+              <a:rPr lang="en-US" altLang="zh-TW" dirty="0" smtClean="0"/>
+              <a:t>Demo for Unit Tests</a:t>
+            </a:r>
+            <a:endParaRPr lang="zh-TW" altLang="en-US" dirty="0"/>
+          </a:p>
+        </p:txBody>
+      </p:sp>
+    </p:spTree>
+    <p:extLst>
+      <p:ext uri="{BB962C8B-B14F-4D97-AF65-F5344CB8AC3E}">
+        <p14:creationId xmlns:p14="http://schemas.microsoft.com/office/powerpoint/2010/main" val="93982817"/>
+      </p:ext>
+    </p:extLst>
+  </p:cSld>
+  <p:clrMapOvr>
+    <a:masterClrMapping/>
+  </p:clrMapOvr>
+  <p:timing>
+    <p:tnLst>
+      <p:par>
+        <p:cTn id="1" dur="indefinite" restart="never" nodeType="tmRoot"/>
+      </p:par>
+    </p:tnLst>
+  </p:timing>
+</p:sld>
+</file>
+
+<file path=ppt/slides/slide12.xml><?xml version="1.0" encoding="utf-8"?>
+<p:sld xmlns:a="http://schemas.openxmlformats.org/drawingml/2006/main" xmlns:r="http://schemas.openxmlformats.org/officeDocument/2006/relationships" xmlns:p="http://schemas.openxmlformats.org/presentationml/2006/main">
+  <p:cSld>
+    <p:spTree>
+      <p:nvGrpSpPr>
+        <p:cNvPr id="1" name=""/>
+        <p:cNvGrpSpPr/>
+        <p:nvPr/>
+      </p:nvGrpSpPr>
+      <p:grpSpPr>
+        <a:xfrm>
+          <a:off x="0" y="0"/>
+          <a:ext cx="0" cy="0"/>
+          <a:chOff x="0" y="0"/>
+          <a:chExt cx="0" cy="0"/>
+        </a:xfrm>
+      </p:grpSpPr>
+      <p:sp>
+        <p:nvSpPr>
+          <p:cNvPr id="2" name="標題 1"/>
+          <p:cNvSpPr>
+            <a:spLocks noGrp="1"/>
+          </p:cNvSpPr>
+          <p:nvPr>
+            <p:ph type="title"/>
+          </p:nvPr>
+        </p:nvSpPr>
+        <p:spPr>
+          <a:xfrm>
+            <a:off x="2592925" y="624110"/>
+            <a:ext cx="8911687" cy="922057"/>
+          </a:xfrm>
+        </p:spPr>
+        <p:txBody>
+          <a:bodyPr/>
+          <a:lstStyle/>
+          <a:p>
+            <a:r>
+              <a:rPr lang="en-US" altLang="zh-TW" dirty="0" smtClean="0"/>
+              <a:t>Source </a:t>
+            </a:r>
+            <a:r>
+              <a:rPr lang="en-US" altLang="zh-TW" dirty="0"/>
+              <a:t>code of a significant test </a:t>
+            </a:r>
+            <a:r>
+              <a:rPr lang="en-US" altLang="zh-TW" dirty="0" smtClean="0"/>
+              <a:t>case</a:t>
+            </a:r>
+            <a:endParaRPr lang="zh-TW" altLang="en-US" dirty="0"/>
+          </a:p>
+        </p:txBody>
+      </p:sp>
+      <p:pic>
+        <p:nvPicPr>
+          <p:cNvPr id="5" name="圖片 4"/>
+          <p:cNvPicPr>
+            <a:picLocks noChangeAspect="1"/>
+          </p:cNvPicPr>
+          <p:nvPr/>
+        </p:nvPicPr>
+        <p:blipFill>
+          <a:blip r:embed="rId2"/>
+          <a:stretch>
+            <a:fillRect/>
+          </a:stretch>
+        </p:blipFill>
+        <p:spPr>
+          <a:xfrm>
+            <a:off x="241324" y="1936867"/>
+            <a:ext cx="5041874" cy="3403529"/>
+          </a:xfrm>
+          <a:prstGeom prst="rect">
+            <a:avLst/>
+          </a:prstGeom>
+        </p:spPr>
+      </p:pic>
+      <p:pic>
+        <p:nvPicPr>
+          <p:cNvPr id="6" name="圖片 5"/>
+          <p:cNvPicPr>
+            <a:picLocks noChangeAspect="1"/>
+          </p:cNvPicPr>
+          <p:nvPr/>
+        </p:nvPicPr>
+        <p:blipFill>
+          <a:blip r:embed="rId3"/>
+          <a:stretch>
+            <a:fillRect/>
+          </a:stretch>
+        </p:blipFill>
+        <p:spPr>
+          <a:xfrm>
+            <a:off x="5525829" y="1936866"/>
+            <a:ext cx="6666171" cy="3403529"/>
+          </a:xfrm>
+          <a:prstGeom prst="rect">
+            <a:avLst/>
+          </a:prstGeom>
+        </p:spPr>
+      </p:pic>
+      <p:sp>
+        <p:nvSpPr>
+          <p:cNvPr id="7" name="文字方塊 6"/>
+          <p:cNvSpPr txBox="1"/>
+          <p:nvPr/>
+        </p:nvSpPr>
+        <p:spPr>
+          <a:xfrm>
+            <a:off x="241324" y="1470952"/>
+            <a:ext cx="1995055" cy="369332"/>
+          </a:xfrm>
+          <a:prstGeom prst="rect">
+            <a:avLst/>
+          </a:prstGeom>
+          <a:noFill/>
+        </p:spPr>
+        <p:txBody>
+          <a:bodyPr wrap="square" rtlCol="0">
+            <a:spAutoFit/>
+          </a:bodyPr>
+          <a:lstStyle/>
+          <a:p>
+            <a:r>
+              <a:rPr lang="en-US" altLang="zh-TW" dirty="0" err="1" smtClean="0"/>
+              <a:t>TestManager</a:t>
+            </a:r>
+            <a:endParaRPr lang="zh-TW" altLang="en-US" dirty="0"/>
+          </a:p>
+        </p:txBody>
+      </p:sp>
+      <p:sp>
+        <p:nvSpPr>
+          <p:cNvPr id="9" name="矩形 8"/>
+          <p:cNvSpPr/>
+          <p:nvPr/>
+        </p:nvSpPr>
+        <p:spPr>
+          <a:xfrm>
+            <a:off x="5525829" y="1454327"/>
+            <a:ext cx="2007281" cy="369332"/>
+          </a:xfrm>
+          <a:prstGeom prst="rect">
+            <a:avLst/>
+          </a:prstGeom>
+        </p:spPr>
+        <p:txBody>
+          <a:bodyPr wrap="none">
+            <a:spAutoFit/>
+          </a:bodyPr>
+          <a:lstStyle/>
+          <a:p>
+            <a:r>
+              <a:rPr lang="en-US" altLang="zh-TW" dirty="0" err="1" smtClean="0"/>
+              <a:t>ProjectManager</a:t>
+            </a:r>
+            <a:endParaRPr lang="zh-TW" altLang="en-US" dirty="0"/>
+          </a:p>
+        </p:txBody>
+      </p:sp>
+    </p:spTree>
+    <p:extLst>
+      <p:ext uri="{BB962C8B-B14F-4D97-AF65-F5344CB8AC3E}">
+        <p14:creationId xmlns:p14="http://schemas.microsoft.com/office/powerpoint/2010/main" val="3495328834"/>
+      </p:ext>
+    </p:extLst>
+  </p:cSld>
+  <p:clrMapOvr>
+    <a:masterClrMapping/>
+  </p:clrMapOvr>
+  <p:timing>
+    <p:tnLst>
+      <p:par>
+        <p:cTn id="1" dur="indefinite" restart="never" nodeType="tmRoot"/>
+      </p:par>
+    </p:tnLst>
+  </p:timing>
+</p:sld>
+</file>
+
+<file path=ppt/slides/slide13.xml><?xml version="1.0" encoding="utf-8"?>
+<p:sld xmlns:a="http://schemas.openxmlformats.org/drawingml/2006/main" xmlns:r="http://schemas.openxmlformats.org/officeDocument/2006/relationships" xmlns:p="http://schemas.openxmlformats.org/presentationml/2006/main">
+  <p:cSld>
+    <p:spTree>
+      <p:nvGrpSpPr>
+        <p:cNvPr id="1" name=""/>
+        <p:cNvGrpSpPr/>
+        <p:nvPr/>
+      </p:nvGrpSpPr>
+      <p:grpSpPr>
+        <a:xfrm>
+          <a:off x="0" y="0"/>
+          <a:ext cx="0" cy="0"/>
+          <a:chOff x="0" y="0"/>
+          <a:chExt cx="0" cy="0"/>
+        </a:xfrm>
+      </p:grpSpPr>
+      <p:sp>
+        <p:nvSpPr>
+          <p:cNvPr id="4" name="標題 1"/>
+          <p:cNvSpPr>
+            <a:spLocks noGrp="1"/>
+          </p:cNvSpPr>
+          <p:nvPr>
+            <p:ph type="title"/>
+          </p:nvPr>
+        </p:nvSpPr>
+        <p:spPr>
+          <a:xfrm>
+            <a:off x="1678525" y="2868547"/>
+            <a:ext cx="8911687" cy="730864"/>
+          </a:xfrm>
+        </p:spPr>
+        <p:txBody>
+          <a:bodyPr/>
+          <a:lstStyle/>
+          <a:p>
+            <a:pPr algn="ctr"/>
+            <a:r>
+              <a:rPr lang="en-US" altLang="zh-TW" dirty="0"/>
+              <a:t>Lessons learned</a:t>
+            </a:r>
+            <a:endParaRPr lang="zh-TW" altLang="en-US" dirty="0"/>
+          </a:p>
+        </p:txBody>
+      </p:sp>
+    </p:spTree>
+    <p:extLst>
+      <p:ext uri="{BB962C8B-B14F-4D97-AF65-F5344CB8AC3E}">
+        <p14:creationId xmlns:p14="http://schemas.microsoft.com/office/powerpoint/2010/main" val="2843880177"/>
+      </p:ext>
+    </p:extLst>
+  </p:cSld>
+  <p:clrMapOvr>
+    <a:masterClrMapping/>
+  </p:clrMapOvr>
+  <p:timing>
+    <p:tnLst>
+      <p:par>
+        <p:cTn id="1" dur="indefinite" restart="never" nodeType="tmRoot"/>
+      </p:par>
+    </p:tnLst>
+  </p:timing>
+</p:sld>
+</file>
+
+<file path=ppt/slides/slide14.xml><?xml version="1.0" encoding="utf-8"?>
+<p:sld xmlns:a="http://schemas.openxmlformats.org/drawingml/2006/main" xmlns:r="http://schemas.openxmlformats.org/officeDocument/2006/relationships" xmlns:p="http://schemas.openxmlformats.org/presentationml/2006/main">
+  <p:cSld>
+    <p:spTree>
+      <p:nvGrpSpPr>
+        <p:cNvPr id="1" name=""/>
+        <p:cNvGrpSpPr/>
+        <p:nvPr/>
+      </p:nvGrpSpPr>
+      <p:grpSpPr>
+        <a:xfrm>
+          <a:off x="0" y="0"/>
+          <a:ext cx="0" cy="0"/>
+          <a:chOff x="0" y="0"/>
+          <a:chExt cx="0" cy="0"/>
+        </a:xfrm>
+      </p:grpSpPr>
+      <p:sp>
+        <p:nvSpPr>
+          <p:cNvPr id="2" name="標題 1"/>
+          <p:cNvSpPr>
+            <a:spLocks noGrp="1"/>
+          </p:cNvSpPr>
+          <p:nvPr>
+            <p:ph type="title"/>
+          </p:nvPr>
+        </p:nvSpPr>
+        <p:spPr>
+          <a:xfrm>
+            <a:off x="1774565" y="2696354"/>
             <a:ext cx="8911687" cy="1280890"/>
           </a:xfrm>
         </p:spPr>
@@ -7821,7 +8352,11 @@
             <a:pPr algn="ctr"/>
             <a:r>
               <a:rPr lang="en-US" altLang="zh-TW" sz="6600" dirty="0" smtClean="0"/>
-              <a:t>Thanks for listening!</a:t>
+              <a:t>Thanks for </a:t>
+            </a:r>
+            <a:r>
+              <a:rPr lang="en-US" altLang="zh-TW" sz="6600" dirty="0" smtClean="0"/>
+              <a:t>listening</a:t>
             </a:r>
             <a:endParaRPr lang="zh-TW" altLang="en-US" sz="6600" dirty="0"/>
           </a:p>
@@ -8279,15 +8814,32 @@
           </a:p>
         </p:txBody>
       </p:sp>
+      <p:sp>
+        <p:nvSpPr>
+          <p:cNvPr id="3" name="內容版面配置區 2"/>
+          <p:cNvSpPr>
+            <a:spLocks noGrp="1"/>
+          </p:cNvSpPr>
+          <p:nvPr>
+            <p:ph idx="1"/>
+          </p:nvPr>
+        </p:nvSpPr>
+        <p:spPr/>
+        <p:txBody>
+          <a:bodyPr/>
+          <a:lstStyle/>
+          <a:p>
+            <a:endParaRPr lang="zh-TW" altLang="en-US"/>
+          </a:p>
+        </p:txBody>
+      </p:sp>
       <p:pic>
         <p:nvPicPr>
-          <p:cNvPr id="4" name="內容版面配置區 3"/>
+          <p:cNvPr id="5" name="圖片 4"/>
           <p:cNvPicPr>
-            <a:picLocks noGrp="1" noChangeAspect="1"/>
+            <a:picLocks noChangeAspect="1"/>
           </p:cNvPicPr>
-          <p:nvPr>
-            <p:ph idx="1"/>
-          </p:nvPr>
+          <p:nvPr/>
         </p:nvPicPr>
         <p:blipFill>
           <a:blip r:embed="rId2"/>
@@ -8297,8 +8849,8 @@
         </p:blipFill>
         <p:spPr>
           <a:xfrm>
-            <a:off x="1806247" y="1400502"/>
-            <a:ext cx="7826483" cy="5227151"/>
+            <a:off x="2077657" y="1198601"/>
+            <a:ext cx="8428571" cy="5647619"/>
           </a:xfrm>
           <a:prstGeom prst="rect">
             <a:avLst/>
@@ -8352,16 +8904,23 @@
             <p:ph type="title"/>
           </p:nvPr>
         </p:nvSpPr>
-        <p:spPr/>
-        <p:txBody>
-          <a:bodyPr/>
+        <p:spPr>
+          <a:xfrm>
+            <a:off x="1620336" y="565921"/>
+            <a:ext cx="8911687" cy="1280890"/>
+          </a:xfrm>
+        </p:spPr>
+        <p:txBody>
+          <a:bodyPr>
+            <a:normAutofit/>
+          </a:bodyPr>
           <a:lstStyle/>
           <a:p>
             <a:r>
-              <a:rPr lang="en-US" altLang="zh-TW" dirty="0"/>
+              <a:rPr lang="en-US" altLang="zh-TW" sz="4000" dirty="0"/>
               <a:t>LOC of test code</a:t>
             </a:r>
-            <a:endParaRPr lang="zh-TW" altLang="en-US" dirty="0"/>
+            <a:endParaRPr lang="zh-TW" altLang="en-US" sz="4000" dirty="0"/>
           </a:p>
         </p:txBody>
       </p:sp>
@@ -8375,15 +8934,88 @@
             <p:ph idx="1"/>
           </p:nvPr>
         </p:nvSpPr>
-        <p:spPr/>
-        <p:txBody>
-          <a:bodyPr/>
+        <p:spPr>
+          <a:xfrm>
+            <a:off x="1895017" y="1680598"/>
+            <a:ext cx="8915400" cy="3777622"/>
+          </a:xfrm>
+        </p:spPr>
+        <p:txBody>
+          <a:bodyPr>
+            <a:normAutofit/>
+          </a:bodyPr>
           <a:lstStyle/>
           <a:p>
-            <a:endParaRPr lang="zh-TW" altLang="en-US" dirty="0"/>
-          </a:p>
-        </p:txBody>
-      </p:sp>
+            <a:r>
+              <a:rPr lang="en-US" altLang="zh-TW" sz="2800" dirty="0" smtClean="0"/>
+              <a:t>Total Unit Test : 41</a:t>
+            </a:r>
+          </a:p>
+          <a:p>
+            <a:r>
+              <a:rPr lang="en-US" altLang="zh-TW" sz="2800" dirty="0" smtClean="0"/>
+              <a:t>LOC of test code:773</a:t>
+            </a:r>
+          </a:p>
+          <a:p>
+            <a:r>
+              <a:rPr lang="en-US" altLang="zh-TW" sz="2800" dirty="0" err="1" smtClean="0"/>
+              <a:t>Test:All</a:t>
+            </a:r>
+            <a:r>
+              <a:rPr lang="en-US" altLang="zh-TW" sz="2800" dirty="0" smtClean="0"/>
+              <a:t> pass</a:t>
+            </a:r>
+            <a:endParaRPr lang="zh-TW" altLang="en-US" sz="2800" dirty="0"/>
+          </a:p>
+        </p:txBody>
+      </p:sp>
+      <p:pic>
+        <p:nvPicPr>
+          <p:cNvPr id="5" name="圖片 4"/>
+          <p:cNvPicPr/>
+          <p:nvPr/>
+        </p:nvPicPr>
+        <p:blipFill>
+          <a:blip r:embed="rId2"/>
+          <a:stretch>
+            <a:fillRect/>
+          </a:stretch>
+        </p:blipFill>
+        <p:spPr>
+          <a:xfrm>
+            <a:off x="7577797" y="5833980"/>
+            <a:ext cx="3776935" cy="1006344"/>
+          </a:xfrm>
+          <a:prstGeom prst="rect">
+            <a:avLst/>
+          </a:prstGeom>
+        </p:spPr>
+      </p:pic>
+      <p:pic>
+        <p:nvPicPr>
+          <p:cNvPr id="6" name="圖片 5"/>
+          <p:cNvPicPr>
+            <a:picLocks noChangeAspect="1"/>
+          </p:cNvPicPr>
+          <p:nvPr/>
+        </p:nvPicPr>
+        <p:blipFill>
+          <a:blip r:embed="rId3"/>
+          <a:stretch>
+            <a:fillRect/>
+          </a:stretch>
+        </p:blipFill>
+        <p:spPr>
+          <a:xfrm>
+            <a:off x="7577796" y="718477"/>
+            <a:ext cx="3776935" cy="5115503"/>
+          </a:xfrm>
+          <a:prstGeom prst="rect">
+            <a:avLst/>
+          </a:prstGeom>
+        </p:spPr>
+      </p:pic>
     </p:spTree>
     <p:extLst>
       <p:ext uri="{BB962C8B-B14F-4D97-AF65-F5344CB8AC3E}">
@@ -8431,17 +9063,24 @@
             <p:ph type="title"/>
           </p:nvPr>
         </p:nvSpPr>
-        <p:spPr/>
-        <p:txBody>
-          <a:bodyPr/>
+        <p:spPr>
+          <a:xfrm>
+            <a:off x="357030" y="560663"/>
+            <a:ext cx="8911687" cy="1280890"/>
+          </a:xfrm>
+        </p:spPr>
+        <p:txBody>
+          <a:bodyPr>
+            <a:normAutofit/>
+          </a:bodyPr>
           <a:lstStyle/>
           <a:p>
             <a:pPr algn="ctr"/>
             <a:r>
-              <a:rPr lang="en-US" altLang="zh-TW" dirty="0" smtClean="0"/>
+              <a:rPr lang="en-US" altLang="zh-TW" sz="4000" dirty="0" smtClean="0"/>
               <a:t>TOTAL TIME FOR MEMBERS</a:t>
             </a:r>
-            <a:endParaRPr lang="zh-TW" altLang="en-US" dirty="0"/>
+            <a:endParaRPr lang="zh-TW" altLang="en-US" sz="4000" dirty="0"/>
           </a:p>
         </p:txBody>
       </p:sp>
@@ -8473,7 +9112,7 @@
       </p:pic>
       <p:pic>
         <p:nvPicPr>
-          <p:cNvPr id="7" name="圖片 6"/>
+          <p:cNvPr id="3" name="圖片 2"/>
           <p:cNvPicPr>
             <a:picLocks noChangeAspect="1"/>
           </p:cNvPicPr>
@@ -8487,14 +9126,68 @@
         </p:blipFill>
         <p:spPr>
           <a:xfrm>
-            <a:off x="4828819" y="1321676"/>
-            <a:ext cx="4195707" cy="5325800"/>
+            <a:off x="4828819" y="1363304"/>
+            <a:ext cx="3874606" cy="5299507"/>
           </a:xfrm>
           <a:prstGeom prst="rect">
             <a:avLst/>
           </a:prstGeom>
         </p:spPr>
       </p:pic>
+      <p:sp>
+        <p:nvSpPr>
+          <p:cNvPr id="4" name="文字方塊 3"/>
+          <p:cNvSpPr txBox="1"/>
+          <p:nvPr/>
+        </p:nvSpPr>
+        <p:spPr>
+          <a:xfrm>
+            <a:off x="8803178" y="3306741"/>
+            <a:ext cx="3233651" cy="646331"/>
+          </a:xfrm>
+          <a:prstGeom prst="rect">
+            <a:avLst/>
+          </a:prstGeom>
+          <a:noFill/>
+        </p:spPr>
+        <p:txBody>
+          <a:bodyPr wrap="square" rtlCol="0">
+            <a:spAutoFit/>
+          </a:bodyPr>
+          <a:lstStyle/>
+          <a:p>
+            <a:pPr algn="ctr"/>
+            <a:r>
+              <a:rPr lang="en-US" altLang="zh-TW" b="1" dirty="0" smtClean="0">
+                <a:solidFill>
+                  <a:srgbClr val="FF0000"/>
+                </a:solidFill>
+              </a:rPr>
+              <a:t>Total time for whole project:</a:t>
+            </a:r>
+            <a:br>
+              <a:rPr lang="en-US" altLang="zh-TW" b="1" dirty="0" smtClean="0">
+                <a:solidFill>
+                  <a:srgbClr val="FF0000"/>
+                </a:solidFill>
+              </a:rPr>
+            </a:br>
+            <a:r>
+              <a:rPr lang="en-US" altLang="zh-TW" b="1" dirty="0" smtClean="0">
+                <a:solidFill>
+                  <a:srgbClr val="FF0000"/>
+                </a:solidFill>
+              </a:rPr>
+              <a:t>57.7hr</a:t>
+            </a:r>
+            <a:endParaRPr lang="zh-TW" altLang="en-US" b="1" dirty="0">
+              <a:solidFill>
+                <a:srgbClr val="FF0000"/>
+              </a:solidFill>
+            </a:endParaRPr>
+          </a:p>
+        </p:txBody>
+      </p:sp>
     </p:spTree>
     <p:extLst>
       <p:ext uri="{BB962C8B-B14F-4D97-AF65-F5344CB8AC3E}">
@@ -8542,34 +9235,54 @@
             <p:ph type="title"/>
           </p:nvPr>
         </p:nvSpPr>
-        <p:spPr/>
+        <p:spPr>
+          <a:xfrm>
+            <a:off x="1620336" y="657361"/>
+            <a:ext cx="8911687" cy="1280890"/>
+          </a:xfrm>
+        </p:spPr>
         <p:txBody>
           <a:bodyPr/>
           <a:lstStyle/>
           <a:p>
-            <a:endParaRPr lang="zh-TW" altLang="en-US"/>
-          </a:p>
-        </p:txBody>
-      </p:sp>
-      <p:sp>
-        <p:nvSpPr>
-          <p:cNvPr id="3" name="內容版面配置區 2"/>
-          <p:cNvSpPr>
-            <a:spLocks noGrp="1"/>
-          </p:cNvSpPr>
-          <p:nvPr>
-            <p:ph idx="1"/>
-          </p:nvPr>
-        </p:nvSpPr>
-        <p:spPr/>
-        <p:txBody>
-          <a:bodyPr/>
-          <a:lstStyle/>
-          <a:p>
-            <a:endParaRPr lang="zh-TW" altLang="en-US"/>
-          </a:p>
-        </p:txBody>
-      </p:sp>
+            <a:r>
+              <a:rPr lang="en-US" altLang="zh-TW" dirty="0" smtClean="0"/>
+              <a:t>Design Class Diagram</a:t>
+            </a:r>
+            <a:endParaRPr lang="zh-TW" altLang="en-US" dirty="0"/>
+          </a:p>
+        </p:txBody>
+      </p:sp>
+      <p:pic>
+        <p:nvPicPr>
+          <p:cNvPr id="9" name="圖片 8"/>
+          <p:cNvPicPr>
+            <a:picLocks noChangeAspect="1"/>
+          </p:cNvPicPr>
+          <p:nvPr/>
+        </p:nvPicPr>
+        <p:blipFill>
+          <a:blip r:embed="rId2" cstate="print">
+            <a:extLst>
+              <a:ext uri="{28A0092B-C50C-407E-A947-70E740481C1C}">
+                <a14:useLocalDpi xmlns:a14="http://schemas.microsoft.com/office/drawing/2010/main" val="0"/>
+              </a:ext>
+            </a:extLst>
+          </a:blip>
+          <a:stretch>
+            <a:fillRect/>
+          </a:stretch>
+        </p:blipFill>
+        <p:spPr>
+          <a:xfrm>
+            <a:off x="678082" y="0"/>
+            <a:ext cx="11118468" cy="6858000"/>
+          </a:xfrm>
+          <a:prstGeom prst="rect">
+            <a:avLst/>
+          </a:prstGeom>
+        </p:spPr>
+      </p:pic>
     </p:spTree>
     <p:extLst>
       <p:ext uri="{BB962C8B-B14F-4D97-AF65-F5344CB8AC3E}">
@@ -8583,7 +9296,75 @@
   <p:timing>
     <p:tnLst>
       <p:par>
-        <p:cTn id="1" dur="indefinite" restart="never" nodeType="tmRoot"/>
+        <p:cTn id="1" dur="indefinite" restart="never" nodeType="tmRoot">
+          <p:childTnLst>
+            <p:seq concurrent="1" nextAc="seek">
+              <p:cTn id="2" dur="indefinite" nodeType="mainSeq">
+                <p:childTnLst>
+                  <p:par>
+                    <p:cTn id="3" fill="hold">
+                      <p:stCondLst>
+                        <p:cond delay="indefinite"/>
+                      </p:stCondLst>
+                      <p:childTnLst>
+                        <p:par>
+                          <p:cTn id="4" fill="hold">
+                            <p:stCondLst>
+                              <p:cond delay="0"/>
+                            </p:stCondLst>
+                            <p:childTnLst>
+                              <p:par>
+                                <p:cTn id="5" presetID="1" presetClass="entr" presetSubtype="0" fill="hold" nodeType="clickEffect">
+                                  <p:stCondLst>
+                                    <p:cond delay="0"/>
+                                  </p:stCondLst>
+                                  <p:childTnLst>
+                                    <p:set>
+                                      <p:cBhvr>
+                                        <p:cTn id="6" dur="1" fill="hold">
+                                          <p:stCondLst>
+                                            <p:cond delay="0"/>
+                                          </p:stCondLst>
+                                        </p:cTn>
+                                        <p:tgtEl>
+                                          <p:spTgt spid="9"/>
+                                        </p:tgtEl>
+                                        <p:attrNameLst>
+                                          <p:attrName>style.visibility</p:attrName>
+                                        </p:attrNameLst>
+                                      </p:cBhvr>
+                                      <p:to>
+                                        <p:strVal val="visible"/>
+                                      </p:to>
+                                    </p:set>
+                                  </p:childTnLst>
+                                </p:cTn>
+                              </p:par>
+                            </p:childTnLst>
+                          </p:cTn>
+                        </p:par>
+                      </p:childTnLst>
+                    </p:cTn>
+                  </p:par>
+                </p:childTnLst>
+              </p:cTn>
+              <p:prevCondLst>
+                <p:cond evt="onPrev" delay="0">
+                  <p:tgtEl>
+                    <p:sldTgt/>
+                  </p:tgtEl>
+                </p:cond>
+              </p:prevCondLst>
+              <p:nextCondLst>
+                <p:cond evt="onNext" delay="0">
+                  <p:tgtEl>
+                    <p:sldTgt/>
+                  </p:tgtEl>
+                </p:cond>
+              </p:nextCondLst>
+            </p:seq>
+          </p:childTnLst>
+        </p:cTn>
       </p:par>
     </p:tnLst>
   </p:timing>
@@ -8617,43 +9398,84 @@
             <p:ph type="title"/>
           </p:nvPr>
         </p:nvSpPr>
-        <p:spPr/>
-        <p:txBody>
-          <a:bodyPr/>
+        <p:spPr>
+          <a:xfrm>
+            <a:off x="1720089" y="565921"/>
+            <a:ext cx="10682500" cy="1280890"/>
+          </a:xfrm>
+        </p:spPr>
+        <p:txBody>
+          <a:bodyPr>
+            <a:noAutofit/>
+          </a:bodyPr>
           <a:lstStyle/>
           <a:p>
-            <a:pPr algn="ctr"/>
-            <a:r>
-              <a:rPr lang="en-US" altLang="zh-TW" dirty="0" smtClean="0"/>
-              <a:t>ALL UNIT TESTS</a:t>
-            </a:r>
-            <a:endParaRPr lang="zh-TW" altLang="en-US" dirty="0"/>
-          </a:p>
-        </p:txBody>
-      </p:sp>
-      <p:sp>
-        <p:nvSpPr>
-          <p:cNvPr id="3" name="內容版面配置區 2"/>
-          <p:cNvSpPr>
-            <a:spLocks noGrp="1"/>
-          </p:cNvSpPr>
-          <p:nvPr>
-            <p:ph idx="1"/>
-          </p:nvPr>
-        </p:nvSpPr>
-        <p:spPr/>
-        <p:txBody>
-          <a:bodyPr/>
+            <a:r>
+              <a:rPr lang="en-US" altLang="zh-TW" sz="4000" dirty="0" smtClean="0"/>
+              <a:t>Source code of significant functionality</a:t>
+            </a:r>
+            <a:endParaRPr lang="zh-TW" altLang="en-US" sz="4000" dirty="0"/>
+          </a:p>
+        </p:txBody>
+      </p:sp>
+      <p:pic>
+        <p:nvPicPr>
+          <p:cNvPr id="4" name="圖片 3"/>
+          <p:cNvPicPr>
+            <a:picLocks noChangeAspect="1"/>
+          </p:cNvPicPr>
+          <p:nvPr/>
+        </p:nvPicPr>
+        <p:blipFill>
+          <a:blip r:embed="rId2"/>
+          <a:stretch>
+            <a:fillRect/>
+          </a:stretch>
+        </p:blipFill>
+        <p:spPr>
+          <a:xfrm>
+            <a:off x="2299489" y="2405477"/>
+            <a:ext cx="9205123" cy="3570893"/>
+          </a:xfrm>
+          <a:prstGeom prst="rect">
+            <a:avLst/>
+          </a:prstGeom>
+        </p:spPr>
+      </p:pic>
+      <p:sp>
+        <p:nvSpPr>
+          <p:cNvPr id="5" name="文字方塊 4"/>
+          <p:cNvSpPr txBox="1"/>
+          <p:nvPr/>
+        </p:nvSpPr>
+        <p:spPr>
+          <a:xfrm>
+            <a:off x="1521228" y="1720334"/>
+            <a:ext cx="2942707" cy="523220"/>
+          </a:xfrm>
+          <a:prstGeom prst="rect">
+            <a:avLst/>
+          </a:prstGeom>
+          <a:noFill/>
+        </p:spPr>
+        <p:txBody>
+          <a:bodyPr wrap="square" rtlCol="0">
+            <a:spAutoFit/>
+          </a:bodyPr>
           <a:lstStyle/>
           <a:p>
-            <a:endParaRPr lang="zh-TW" altLang="en-US" dirty="0"/>
+            <a:r>
+              <a:rPr lang="en-US" altLang="zh-TW" sz="2800" dirty="0" err="1" smtClean="0"/>
+              <a:t>TestManager</a:t>
+            </a:r>
+            <a:endParaRPr lang="zh-TW" altLang="en-US" sz="2800" dirty="0"/>
           </a:p>
         </p:txBody>
       </p:sp>
     </p:spTree>
     <p:extLst>
       <p:ext uri="{BB962C8B-B14F-4D97-AF65-F5344CB8AC3E}">
-        <p14:creationId xmlns:p14="http://schemas.microsoft.com/office/powerpoint/2010/main" val="93982817"/>
+        <p14:creationId xmlns:p14="http://schemas.microsoft.com/office/powerpoint/2010/main" val="679653510"/>
       </p:ext>
     </p:extLst>
   </p:cSld>

</xml_diff>